<commit_message>
Recent updates for Qtune-Visar
</commit_message>
<xml_diff>
--- a/bigbluebutton-config/web/default.pptx
+++ b/bigbluebutton-config/web/default.pptx
@@ -5,15 +5,15 @@
     <p:sldMasterId id="2147483648" r:id="rId1"/>
   </p:sldMasterIdLst>
   <p:notesMasterIdLst>
-    <p:notesMasterId r:id="rId8"/>
+    <p:notesMasterId r:id="rId9"/>
   </p:notesMasterIdLst>
   <p:sldIdLst>
-    <p:sldId id="256" r:id="rId2"/>
-    <p:sldId id="257" r:id="rId3"/>
-    <p:sldId id="258" r:id="rId4"/>
-    <p:sldId id="259" r:id="rId5"/>
-    <p:sldId id="260" r:id="rId6"/>
-    <p:sldId id="261" r:id="rId7"/>
+    <p:sldId id="256" r:id="rId3"/>
+    <p:sldId id="257" r:id="rId4"/>
+    <p:sldId id="258" r:id="rId5"/>
+    <p:sldId id="259" r:id="rId6"/>
+    <p:sldId id="260" r:id="rId7"/>
+    <p:sldId id="261" r:id="rId8"/>
   </p:sldIdLst>
   <p:sldSz cx="24384000" cy="13716000"/>
   <p:notesSz cx="6858000" cy="9144000"/>
@@ -32,7 +32,6 @@
       <a:buSzTx/>
       <a:buFontTx/>
       <a:buNone/>
-      <a:tabLst/>
       <a:defRPr kumimoji="0" sz="1800" b="0" i="0" u="none" strike="noStrike" cap="none" spc="0" normalizeH="0" baseline="0">
         <a:ln>
           <a:noFill/>
@@ -58,7 +57,6 @@
       <a:buSzTx/>
       <a:buFontTx/>
       <a:buNone/>
-      <a:tabLst/>
       <a:defRPr kumimoji="0" sz="3000" b="1" i="0" u="none" strike="noStrike" cap="none" spc="0" normalizeH="0" baseline="0">
         <a:ln>
           <a:noFill/>
@@ -88,7 +86,6 @@
       <a:buSzTx/>
       <a:buFontTx/>
       <a:buNone/>
-      <a:tabLst/>
       <a:defRPr kumimoji="0" sz="3000" b="1" i="0" u="none" strike="noStrike" cap="none" spc="0" normalizeH="0" baseline="0">
         <a:ln>
           <a:noFill/>
@@ -118,7 +115,6 @@
       <a:buSzTx/>
       <a:buFontTx/>
       <a:buNone/>
-      <a:tabLst/>
       <a:defRPr kumimoji="0" sz="3000" b="1" i="0" u="none" strike="noStrike" cap="none" spc="0" normalizeH="0" baseline="0">
         <a:ln>
           <a:noFill/>
@@ -148,7 +144,6 @@
       <a:buSzTx/>
       <a:buFontTx/>
       <a:buNone/>
-      <a:tabLst/>
       <a:defRPr kumimoji="0" sz="3000" b="1" i="0" u="none" strike="noStrike" cap="none" spc="0" normalizeH="0" baseline="0">
         <a:ln>
           <a:noFill/>
@@ -178,7 +173,6 @@
       <a:buSzTx/>
       <a:buFontTx/>
       <a:buNone/>
-      <a:tabLst/>
       <a:defRPr kumimoji="0" sz="3000" b="1" i="0" u="none" strike="noStrike" cap="none" spc="0" normalizeH="0" baseline="0">
         <a:ln>
           <a:noFill/>
@@ -208,7 +202,6 @@
       <a:buSzTx/>
       <a:buFontTx/>
       <a:buNone/>
-      <a:tabLst/>
       <a:defRPr kumimoji="0" sz="3000" b="1" i="0" u="none" strike="noStrike" cap="none" spc="0" normalizeH="0" baseline="0">
         <a:ln>
           <a:noFill/>
@@ -238,7 +231,6 @@
       <a:buSzTx/>
       <a:buFontTx/>
       <a:buNone/>
-      <a:tabLst/>
       <a:defRPr kumimoji="0" sz="3000" b="1" i="0" u="none" strike="noStrike" cap="none" spc="0" normalizeH="0" baseline="0">
         <a:ln>
           <a:noFill/>
@@ -268,7 +260,6 @@
       <a:buSzTx/>
       <a:buFontTx/>
       <a:buNone/>
-      <a:tabLst/>
       <a:defRPr kumimoji="0" sz="3000" b="1" i="0" u="none" strike="noStrike" cap="none" spc="0" normalizeH="0" baseline="0">
         <a:ln>
           <a:noFill/>
@@ -298,7 +289,6 @@
       <a:buSzTx/>
       <a:buFontTx/>
       <a:buNone/>
-      <a:tabLst/>
       <a:defRPr kumimoji="0" sz="3000" b="1" i="0" u="none" strike="noStrike" cap="none" spc="0" normalizeH="0" baseline="0">
         <a:ln>
           <a:noFill/>
@@ -362,9 +352,7 @@
         <p:txBody>
           <a:bodyPr/>
           <a:lstStyle/>
-          <a:p>
-            <a:endParaRPr/>
-          </a:p>
+          <a:p/>
         </p:txBody>
       </p:sp>
       <p:sp>
@@ -389,23 +377,16 @@
         <p:txBody>
           <a:bodyPr/>
           <a:lstStyle/>
-          <a:p>
-            <a:endParaRPr/>
-          </a:p>
+          <a:p/>
         </p:txBody>
       </p:sp>
     </p:spTree>
-    <p:extLst>
-      <p:ext uri="{BB962C8B-B14F-4D97-AF65-F5344CB8AC3E}">
-        <p14:creationId xmlns:p14="http://schemas.microsoft.com/office/powerpoint/2010/main" val="3102496115"/>
-      </p:ext>
-    </p:extLst>
   </p:cSld>
   <p:clrMap bg1="lt1" tx1="dk1" bg2="lt2" tx2="dk2" accent1="accent1" accent2="accent2" accent3="accent3" accent4="accent4" accent5="accent5" accent6="accent6" hlink="hlink" folHlink="folHlink"/>
   <p:notesStyle>
     <a:lvl1pPr defTabSz="457200" latinLnBrk="0">
       <a:lnSpc>
-        <a:spcPct val="117999"/>
+        <a:spcPct val="118000"/>
       </a:lnSpc>
       <a:defRPr sz="2200">
         <a:latin typeface="Helvetica Neue"/>
@@ -416,7 +397,7 @@
     </a:lvl1pPr>
     <a:lvl2pPr indent="228600" defTabSz="457200" latinLnBrk="0">
       <a:lnSpc>
-        <a:spcPct val="117999"/>
+        <a:spcPct val="118000"/>
       </a:lnSpc>
       <a:defRPr sz="2200">
         <a:latin typeface="Helvetica Neue"/>
@@ -427,7 +408,7 @@
     </a:lvl2pPr>
     <a:lvl3pPr indent="457200" defTabSz="457200" latinLnBrk="0">
       <a:lnSpc>
-        <a:spcPct val="117999"/>
+        <a:spcPct val="118000"/>
       </a:lnSpc>
       <a:defRPr sz="2200">
         <a:latin typeface="Helvetica Neue"/>
@@ -438,7 +419,7 @@
     </a:lvl3pPr>
     <a:lvl4pPr indent="685800" defTabSz="457200" latinLnBrk="0">
       <a:lnSpc>
-        <a:spcPct val="117999"/>
+        <a:spcPct val="118000"/>
       </a:lnSpc>
       <a:defRPr sz="2200">
         <a:latin typeface="Helvetica Neue"/>
@@ -449,7 +430,7 @@
     </a:lvl4pPr>
     <a:lvl5pPr indent="914400" defTabSz="457200" latinLnBrk="0">
       <a:lnSpc>
-        <a:spcPct val="117999"/>
+        <a:spcPct val="118000"/>
       </a:lnSpc>
       <a:defRPr sz="2200">
         <a:latin typeface="Helvetica Neue"/>
@@ -460,7 +441,7 @@
     </a:lvl5pPr>
     <a:lvl6pPr indent="1143000" defTabSz="457200" latinLnBrk="0">
       <a:lnSpc>
-        <a:spcPct val="117999"/>
+        <a:spcPct val="118000"/>
       </a:lnSpc>
       <a:defRPr sz="2200">
         <a:latin typeface="Helvetica Neue"/>
@@ -471,7 +452,7 @@
     </a:lvl6pPr>
     <a:lvl7pPr indent="1371600" defTabSz="457200" latinLnBrk="0">
       <a:lnSpc>
-        <a:spcPct val="117999"/>
+        <a:spcPct val="118000"/>
       </a:lnSpc>
       <a:defRPr sz="2200">
         <a:latin typeface="Helvetica Neue"/>
@@ -482,7 +463,7 @@
     </a:lvl7pPr>
     <a:lvl8pPr indent="1600200" defTabSz="457200" latinLnBrk="0">
       <a:lnSpc>
-        <a:spcPct val="117999"/>
+        <a:spcPct val="118000"/>
       </a:lnSpc>
       <a:defRPr sz="2200">
         <a:latin typeface="Helvetica Neue"/>
@@ -493,7 +474,7 @@
     </a:lvl8pPr>
     <a:lvl9pPr indent="1828800" defTabSz="457200" latinLnBrk="0">
       <a:lnSpc>
-        <a:spcPct val="117999"/>
+        <a:spcPct val="118000"/>
       </a:lnSpc>
       <a:defRPr sz="2200">
         <a:latin typeface="Helvetica Neue"/>
@@ -530,7 +511,7 @@
             <a:spLocks noGrp="1"/>
           </p:cNvSpPr>
           <p:nvPr>
-            <p:ph type="title"/>
+            <p:ph type="title" hasCustomPrompt="1"/>
           </p:nvPr>
         </p:nvSpPr>
         <p:spPr>
@@ -559,7 +540,7 @@
             <a:spLocks noGrp="1"/>
           </p:cNvSpPr>
           <p:nvPr>
-            <p:ph type="body" sz="quarter" idx="1"/>
+            <p:ph type="body" sz="quarter" idx="1" hasCustomPrompt="1"/>
           </p:nvPr>
         </p:nvSpPr>
         <p:spPr>
@@ -666,7 +647,7 @@
           <a:lstStyle/>
           <a:p>
             <a:fld id="{86CB4B4D-7CA3-9044-876B-883B54F8677D}" type="slidenum">
-              <a:t>‹#›</a:t>
+              <a:rPr/>
             </a:fld>
             <a:endParaRPr/>
           </a:p>
@@ -677,7 +658,7 @@
   <p:clrMapOvr>
     <a:masterClrMapping/>
   </p:clrMapOvr>
-  <p:transition xmlns:p14="http://schemas.microsoft.com/office/powerpoint/2010/main" spd="med"/>
+  <p:transition spd="med"/>
 </p:sldLayout>
 </file>
 
@@ -705,7 +686,7 @@
             <a:spLocks noGrp="1"/>
           </p:cNvSpPr>
           <p:nvPr>
-            <p:ph type="body" sz="quarter" idx="13"/>
+            <p:ph type="body" sz="quarter" idx="13" hasCustomPrompt="1"/>
           </p:nvPr>
         </p:nvSpPr>
         <p:spPr>
@@ -745,7 +726,7 @@
             <a:spLocks noGrp="1"/>
           </p:cNvSpPr>
           <p:nvPr>
-            <p:ph type="body" sz="quarter" idx="14"/>
+            <p:ph type="body" sz="quarter" idx="14" hasCustomPrompt="1"/>
           </p:nvPr>
         </p:nvSpPr>
         <p:spPr>
@@ -803,7 +784,7 @@
           <a:lstStyle/>
           <a:p>
             <a:fld id="{86CB4B4D-7CA3-9044-876B-883B54F8677D}" type="slidenum">
-              <a:t>‹#›</a:t>
+              <a:rPr/>
             </a:fld>
             <a:endParaRPr/>
           </a:p>
@@ -814,7 +795,7 @@
   <p:clrMapOvr>
     <a:masterClrMapping/>
   </p:clrMapOvr>
-  <p:transition xmlns:p14="http://schemas.microsoft.com/office/powerpoint/2010/main" spd="med"/>
+  <p:transition spd="med"/>
 </p:sldLayout>
 </file>
 
@@ -859,9 +840,7 @@
             <a:noAutofit/>
           </a:bodyPr>
           <a:lstStyle/>
-          <a:p>
-            <a:endParaRPr/>
-          </a:p>
+          <a:p/>
         </p:txBody>
       </p:sp>
       <p:sp>
@@ -884,7 +863,7 @@
           <a:lstStyle/>
           <a:p>
             <a:fld id="{86CB4B4D-7CA3-9044-876B-883B54F8677D}" type="slidenum">
-              <a:t>‹#›</a:t>
+              <a:rPr/>
             </a:fld>
             <a:endParaRPr/>
           </a:p>
@@ -895,7 +874,7 @@
   <p:clrMapOvr>
     <a:masterClrMapping/>
   </p:clrMapOvr>
-  <p:transition xmlns:p14="http://schemas.microsoft.com/office/powerpoint/2010/main" spd="med"/>
+  <p:transition spd="med"/>
 </p:sldLayout>
 </file>
 
@@ -936,7 +915,7 @@
           <a:lstStyle/>
           <a:p>
             <a:fld id="{86CB4B4D-7CA3-9044-876B-883B54F8677D}" type="slidenum">
-              <a:t>‹#›</a:t>
+              <a:rPr/>
             </a:fld>
             <a:endParaRPr/>
           </a:p>
@@ -947,7 +926,7 @@
   <p:clrMapOvr>
     <a:masterClrMapping/>
   </p:clrMapOvr>
-  <p:transition xmlns:p14="http://schemas.microsoft.com/office/powerpoint/2010/main" spd="med"/>
+  <p:transition spd="med"/>
 </p:sldLayout>
 </file>
 
@@ -992,9 +971,7 @@
             <a:noAutofit/>
           </a:bodyPr>
           <a:lstStyle/>
-          <a:p>
-            <a:endParaRPr/>
-          </a:p>
+          <a:p/>
         </p:txBody>
       </p:sp>
       <p:sp>
@@ -1004,7 +981,7 @@
             <a:spLocks noGrp="1"/>
           </p:cNvSpPr>
           <p:nvPr>
-            <p:ph type="title"/>
+            <p:ph type="title" hasCustomPrompt="1"/>
           </p:nvPr>
         </p:nvSpPr>
         <p:spPr>
@@ -1033,7 +1010,7 @@
             <a:spLocks noGrp="1"/>
           </p:cNvSpPr>
           <p:nvPr>
-            <p:ph type="body" sz="quarter" idx="1"/>
+            <p:ph type="body" sz="quarter" idx="1" hasCustomPrompt="1"/>
           </p:nvPr>
         </p:nvSpPr>
         <p:spPr>
@@ -1140,7 +1117,7 @@
           <a:lstStyle/>
           <a:p>
             <a:fld id="{86CB4B4D-7CA3-9044-876B-883B54F8677D}" type="slidenum">
-              <a:t>‹#›</a:t>
+              <a:rPr/>
             </a:fld>
             <a:endParaRPr/>
           </a:p>
@@ -1151,7 +1128,7 @@
   <p:clrMapOvr>
     <a:masterClrMapping/>
   </p:clrMapOvr>
-  <p:transition xmlns:p14="http://schemas.microsoft.com/office/powerpoint/2010/main" spd="med"/>
+  <p:transition spd="med"/>
 </p:sldLayout>
 </file>
 
@@ -1179,7 +1156,7 @@
             <a:spLocks noGrp="1"/>
           </p:cNvSpPr>
           <p:nvPr>
-            <p:ph type="title"/>
+            <p:ph type="title" hasCustomPrompt="1"/>
           </p:nvPr>
         </p:nvSpPr>
         <p:spPr>
@@ -1221,7 +1198,7 @@
           <a:lstStyle/>
           <a:p>
             <a:fld id="{86CB4B4D-7CA3-9044-876B-883B54F8677D}" type="slidenum">
-              <a:t>‹#›</a:t>
+              <a:rPr/>
             </a:fld>
             <a:endParaRPr/>
           </a:p>
@@ -1232,7 +1209,7 @@
   <p:clrMapOvr>
     <a:masterClrMapping/>
   </p:clrMapOvr>
-  <p:transition xmlns:p14="http://schemas.microsoft.com/office/powerpoint/2010/main" spd="med"/>
+  <p:transition spd="med"/>
 </p:sldLayout>
 </file>
 
@@ -1277,9 +1254,7 @@
             <a:noAutofit/>
           </a:bodyPr>
           <a:lstStyle/>
-          <a:p>
-            <a:endParaRPr/>
-          </a:p>
+          <a:p/>
         </p:txBody>
       </p:sp>
       <p:sp>
@@ -1289,7 +1264,7 @@
             <a:spLocks noGrp="1"/>
           </p:cNvSpPr>
           <p:nvPr>
-            <p:ph type="title"/>
+            <p:ph type="title" hasCustomPrompt="1"/>
           </p:nvPr>
         </p:nvSpPr>
         <p:spPr>
@@ -1322,7 +1297,7 @@
             <a:spLocks noGrp="1"/>
           </p:cNvSpPr>
           <p:nvPr>
-            <p:ph type="body" sz="quarter" idx="1"/>
+            <p:ph type="body" sz="quarter" idx="1" hasCustomPrompt="1"/>
           </p:nvPr>
         </p:nvSpPr>
         <p:spPr>
@@ -1429,7 +1404,7 @@
           <a:lstStyle/>
           <a:p>
             <a:fld id="{86CB4B4D-7CA3-9044-876B-883B54F8677D}" type="slidenum">
-              <a:t>‹#›</a:t>
+              <a:rPr/>
             </a:fld>
             <a:endParaRPr/>
           </a:p>
@@ -1440,7 +1415,7 @@
   <p:clrMapOvr>
     <a:masterClrMapping/>
   </p:clrMapOvr>
-  <p:transition xmlns:p14="http://schemas.microsoft.com/office/powerpoint/2010/main" spd="med"/>
+  <p:transition spd="med"/>
 </p:sldLayout>
 </file>
 
@@ -1468,7 +1443,7 @@
             <a:spLocks noGrp="1"/>
           </p:cNvSpPr>
           <p:nvPr>
-            <p:ph type="title"/>
+            <p:ph type="title" hasCustomPrompt="1"/>
           </p:nvPr>
         </p:nvSpPr>
         <p:spPr>
@@ -1506,7 +1481,7 @@
           <a:lstStyle/>
           <a:p>
             <a:fld id="{86CB4B4D-7CA3-9044-876B-883B54F8677D}" type="slidenum">
-              <a:t>‹#›</a:t>
+              <a:rPr/>
             </a:fld>
             <a:endParaRPr/>
           </a:p>
@@ -1517,7 +1492,7 @@
   <p:clrMapOvr>
     <a:masterClrMapping/>
   </p:clrMapOvr>
-  <p:transition xmlns:p14="http://schemas.microsoft.com/office/powerpoint/2010/main" spd="med"/>
+  <p:transition spd="med"/>
 </p:sldLayout>
 </file>
 
@@ -1545,7 +1520,7 @@
             <a:spLocks noGrp="1"/>
           </p:cNvSpPr>
           <p:nvPr>
-            <p:ph type="title"/>
+            <p:ph type="title" hasCustomPrompt="1"/>
           </p:nvPr>
         </p:nvSpPr>
         <p:spPr>
@@ -1570,7 +1545,7 @@
             <a:spLocks noGrp="1"/>
           </p:cNvSpPr>
           <p:nvPr>
-            <p:ph type="body" idx="1"/>
+            <p:ph type="body" idx="1" hasCustomPrompt="1"/>
           </p:nvPr>
         </p:nvSpPr>
         <p:spPr>
@@ -1648,7 +1623,7 @@
           <a:lstStyle/>
           <a:p>
             <a:fld id="{86CB4B4D-7CA3-9044-876B-883B54F8677D}" type="slidenum">
-              <a:t>‹#›</a:t>
+              <a:rPr/>
             </a:fld>
             <a:endParaRPr/>
           </a:p>
@@ -1659,7 +1634,7 @@
   <p:clrMapOvr>
     <a:masterClrMapping/>
   </p:clrMapOvr>
-  <p:transition xmlns:p14="http://schemas.microsoft.com/office/powerpoint/2010/main" spd="med"/>
+  <p:transition spd="med"/>
 </p:sldLayout>
 </file>
 
@@ -1704,9 +1679,7 @@
             <a:noAutofit/>
           </a:bodyPr>
           <a:lstStyle/>
-          <a:p>
-            <a:endParaRPr/>
-          </a:p>
+          <a:p/>
         </p:txBody>
       </p:sp>
       <p:sp>
@@ -1716,7 +1689,7 @@
             <a:spLocks noGrp="1"/>
           </p:cNvSpPr>
           <p:nvPr>
-            <p:ph type="title"/>
+            <p:ph type="title" hasCustomPrompt="1"/>
           </p:nvPr>
         </p:nvSpPr>
         <p:spPr>
@@ -1741,7 +1714,7 @@
             <a:spLocks noGrp="1"/>
           </p:cNvSpPr>
           <p:nvPr>
-            <p:ph type="body" sz="half" idx="1"/>
+            <p:ph type="body" sz="half" idx="1" hasCustomPrompt="1"/>
           </p:nvPr>
         </p:nvSpPr>
         <p:spPr>
@@ -1838,7 +1811,7 @@
           <a:lstStyle/>
           <a:p>
             <a:fld id="{86CB4B4D-7CA3-9044-876B-883B54F8677D}" type="slidenum">
-              <a:t>‹#›</a:t>
+              <a:rPr/>
             </a:fld>
             <a:endParaRPr/>
           </a:p>
@@ -1849,7 +1822,7 @@
   <p:clrMapOvr>
     <a:masterClrMapping/>
   </p:clrMapOvr>
-  <p:transition xmlns:p14="http://schemas.microsoft.com/office/powerpoint/2010/main" spd="med"/>
+  <p:transition spd="med"/>
 </p:sldLayout>
 </file>
 
@@ -1877,7 +1850,7 @@
             <a:spLocks noGrp="1"/>
           </p:cNvSpPr>
           <p:nvPr>
-            <p:ph type="body" idx="1"/>
+            <p:ph type="body" idx="1" hasCustomPrompt="1"/>
           </p:nvPr>
         </p:nvSpPr>
         <p:spPr>
@@ -1959,7 +1932,7 @@
           <a:lstStyle/>
           <a:p>
             <a:fld id="{86CB4B4D-7CA3-9044-876B-883B54F8677D}" type="slidenum">
-              <a:t>‹#›</a:t>
+              <a:rPr/>
             </a:fld>
             <a:endParaRPr/>
           </a:p>
@@ -1970,7 +1943,7 @@
   <p:clrMapOvr>
     <a:masterClrMapping/>
   </p:clrMapOvr>
-  <p:transition xmlns:p14="http://schemas.microsoft.com/office/powerpoint/2010/main" spd="med"/>
+  <p:transition spd="med"/>
 </p:sldLayout>
 </file>
 
@@ -2015,9 +1988,7 @@
             <a:noAutofit/>
           </a:bodyPr>
           <a:lstStyle/>
-          <a:p>
-            <a:endParaRPr/>
-          </a:p>
+          <a:p/>
         </p:txBody>
       </p:sp>
       <p:sp>
@@ -2044,9 +2015,7 @@
             <a:noAutofit/>
           </a:bodyPr>
           <a:lstStyle/>
-          <a:p>
-            <a:endParaRPr/>
-          </a:p>
+          <a:p/>
         </p:txBody>
       </p:sp>
       <p:sp>
@@ -2073,9 +2042,7 @@
             <a:noAutofit/>
           </a:bodyPr>
           <a:lstStyle/>
-          <a:p>
-            <a:endParaRPr/>
-          </a:p>
+          <a:p/>
         </p:txBody>
       </p:sp>
       <p:sp>
@@ -2098,7 +2065,7 @@
           <a:lstStyle/>
           <a:p>
             <a:fld id="{86CB4B4D-7CA3-9044-876B-883B54F8677D}" type="slidenum">
-              <a:t>‹#›</a:t>
+              <a:rPr/>
             </a:fld>
             <a:endParaRPr/>
           </a:p>
@@ -2109,7 +2076,7 @@
   <p:clrMapOvr>
     <a:masterClrMapping/>
   </p:clrMapOvr>
-  <p:transition xmlns:p14="http://schemas.microsoft.com/office/powerpoint/2010/main" spd="med"/>
+  <p:transition spd="med"/>
 </p:sldLayout>
 </file>
 
@@ -2159,11 +2126,6 @@
           <a:ln w="12700">
             <a:miter lim="400000"/>
           </a:ln>
-          <a:extLst>
-            <a:ext uri="{C572A759-6A51-4108-AA02-DFA0A04FC94B}">
-              <ma14:wrappingTextBoxFlag xmlns:ma14="http://schemas.microsoft.com/office/mac/drawingml/2011/main" val="1"/>
-            </a:ext>
-          </a:extLst>
         </p:spPr>
         <p:txBody>
           <a:bodyPr lIns="50800" tIns="50800" rIns="50800" bIns="50800" anchor="ctr">
@@ -2198,11 +2160,6 @@
           <a:ln w="12700">
             <a:miter lim="400000"/>
           </a:ln>
-          <a:extLst>
-            <a:ext uri="{C572A759-6A51-4108-AA02-DFA0A04FC94B}">
-              <ma14:wrappingTextBoxFlag xmlns:ma14="http://schemas.microsoft.com/office/mac/drawingml/2011/main" val="1"/>
-            </a:ext>
-          </a:extLst>
         </p:spPr>
         <p:txBody>
           <a:bodyPr lIns="50800" tIns="50800" rIns="50800" bIns="50800" anchor="ctr">
@@ -2278,7 +2235,7 @@
           </a:lstStyle>
           <a:p>
             <a:fld id="{86CB4B4D-7CA3-9044-876B-883B54F8677D}" type="slidenum">
-              <a:t>‹#›</a:t>
+              <a:rPr/>
             </a:fld>
             <a:endParaRPr/>
           </a:p>
@@ -2301,7 +2258,7 @@
     <p:sldLayoutId id="2147483659" r:id="rId11"/>
     <p:sldLayoutId id="2147483660" r:id="rId12"/>
   </p:sldLayoutIdLst>
-  <p:transition xmlns:p14="http://schemas.microsoft.com/office/powerpoint/2010/main" spd="med"/>
+  <p:transition spd="med"/>
   <p:txStyles>
     <p:titleStyle>
       <a:lvl1pPr marL="0" marR="0" indent="0" algn="ctr" defTabSz="825500" rtl="0" latinLnBrk="0">
@@ -2318,7 +2275,6 @@
         <a:buSzTx/>
         <a:buFontTx/>
         <a:buNone/>
-        <a:tabLst/>
         <a:defRPr sz="11200" b="0" i="0" u="none" strike="noStrike" cap="none" spc="0" baseline="0">
           <a:ln>
             <a:noFill/>
@@ -2347,7 +2303,6 @@
         <a:buSzTx/>
         <a:buFontTx/>
         <a:buNone/>
-        <a:tabLst/>
         <a:defRPr sz="11200" b="0" i="0" u="none" strike="noStrike" cap="none" spc="0" baseline="0">
           <a:ln>
             <a:noFill/>
@@ -2376,7 +2331,6 @@
         <a:buSzTx/>
         <a:buFontTx/>
         <a:buNone/>
-        <a:tabLst/>
         <a:defRPr sz="11200" b="0" i="0" u="none" strike="noStrike" cap="none" spc="0" baseline="0">
           <a:ln>
             <a:noFill/>
@@ -2405,7 +2359,6 @@
         <a:buSzTx/>
         <a:buFontTx/>
         <a:buNone/>
-        <a:tabLst/>
         <a:defRPr sz="11200" b="0" i="0" u="none" strike="noStrike" cap="none" spc="0" baseline="0">
           <a:ln>
             <a:noFill/>
@@ -2434,7 +2387,6 @@
         <a:buSzTx/>
         <a:buFontTx/>
         <a:buNone/>
-        <a:tabLst/>
         <a:defRPr sz="11200" b="0" i="0" u="none" strike="noStrike" cap="none" spc="0" baseline="0">
           <a:ln>
             <a:noFill/>
@@ -2463,7 +2415,6 @@
         <a:buSzTx/>
         <a:buFontTx/>
         <a:buNone/>
-        <a:tabLst/>
         <a:defRPr sz="11200" b="0" i="0" u="none" strike="noStrike" cap="none" spc="0" baseline="0">
           <a:ln>
             <a:noFill/>
@@ -2492,7 +2443,6 @@
         <a:buSzTx/>
         <a:buFontTx/>
         <a:buNone/>
-        <a:tabLst/>
         <a:defRPr sz="11200" b="0" i="0" u="none" strike="noStrike" cap="none" spc="0" baseline="0">
           <a:ln>
             <a:noFill/>
@@ -2521,7 +2471,6 @@
         <a:buSzTx/>
         <a:buFontTx/>
         <a:buNone/>
-        <a:tabLst/>
         <a:defRPr sz="11200" b="0" i="0" u="none" strike="noStrike" cap="none" spc="0" baseline="0">
           <a:ln>
             <a:noFill/>
@@ -2550,7 +2499,6 @@
         <a:buSzTx/>
         <a:buFontTx/>
         <a:buNone/>
-        <a:tabLst/>
         <a:defRPr sz="11200" b="0" i="0" u="none" strike="noStrike" cap="none" spc="0" baseline="0">
           <a:ln>
             <a:noFill/>
@@ -2581,7 +2529,6 @@
         <a:buSzPct val="125000"/>
         <a:buFontTx/>
         <a:buChar char="•"/>
-        <a:tabLst/>
         <a:defRPr sz="5200" b="0" i="0" u="none" strike="noStrike" cap="none" spc="0" baseline="0">
           <a:ln>
             <a:noFill/>
@@ -2610,7 +2557,6 @@
         <a:buSzPct val="125000"/>
         <a:buFontTx/>
         <a:buChar char="•"/>
-        <a:tabLst/>
         <a:defRPr sz="5200" b="0" i="0" u="none" strike="noStrike" cap="none" spc="0" baseline="0">
           <a:ln>
             <a:noFill/>
@@ -2639,7 +2585,6 @@
         <a:buSzPct val="125000"/>
         <a:buFontTx/>
         <a:buChar char="•"/>
-        <a:tabLst/>
         <a:defRPr sz="5200" b="0" i="0" u="none" strike="noStrike" cap="none" spc="0" baseline="0">
           <a:ln>
             <a:noFill/>
@@ -2668,7 +2613,6 @@
         <a:buSzPct val="125000"/>
         <a:buFontTx/>
         <a:buChar char="•"/>
-        <a:tabLst/>
         <a:defRPr sz="5200" b="0" i="0" u="none" strike="noStrike" cap="none" spc="0" baseline="0">
           <a:ln>
             <a:noFill/>
@@ -2697,7 +2641,6 @@
         <a:buSzPct val="125000"/>
         <a:buFontTx/>
         <a:buChar char="•"/>
-        <a:tabLst/>
         <a:defRPr sz="5200" b="0" i="0" u="none" strike="noStrike" cap="none" spc="0" baseline="0">
           <a:ln>
             <a:noFill/>
@@ -2726,7 +2669,6 @@
         <a:buSzPct val="125000"/>
         <a:buFontTx/>
         <a:buChar char="•"/>
-        <a:tabLst/>
         <a:defRPr sz="5200" b="0" i="0" u="none" strike="noStrike" cap="none" spc="0" baseline="0">
           <a:ln>
             <a:noFill/>
@@ -2755,7 +2697,6 @@
         <a:buSzPct val="125000"/>
         <a:buFontTx/>
         <a:buChar char="•"/>
-        <a:tabLst/>
         <a:defRPr sz="5200" b="0" i="0" u="none" strike="noStrike" cap="none" spc="0" baseline="0">
           <a:ln>
             <a:noFill/>
@@ -2784,7 +2725,6 @@
         <a:buSzPct val="125000"/>
         <a:buFontTx/>
         <a:buChar char="•"/>
-        <a:tabLst/>
         <a:defRPr sz="5200" b="0" i="0" u="none" strike="noStrike" cap="none" spc="0" baseline="0">
           <a:ln>
             <a:noFill/>
@@ -2813,7 +2753,6 @@
         <a:buSzPct val="125000"/>
         <a:buFontTx/>
         <a:buChar char="•"/>
-        <a:tabLst/>
         <a:defRPr sz="5200" b="0" i="0" u="none" strike="noStrike" cap="none" spc="0" baseline="0">
           <a:ln>
             <a:noFill/>
@@ -2844,7 +2783,6 @@
         <a:buSzTx/>
         <a:buFontTx/>
         <a:buNone/>
-        <a:tabLst/>
         <a:defRPr sz="2400" b="0" i="0" u="none" strike="noStrike" cap="none" spc="0" baseline="0">
           <a:ln>
             <a:noFill/>
@@ -2873,7 +2811,6 @@
         <a:buSzTx/>
         <a:buFontTx/>
         <a:buNone/>
-        <a:tabLst/>
         <a:defRPr sz="2400" b="0" i="0" u="none" strike="noStrike" cap="none" spc="0" baseline="0">
           <a:ln>
             <a:noFill/>
@@ -2902,7 +2839,6 @@
         <a:buSzTx/>
         <a:buFontTx/>
         <a:buNone/>
-        <a:tabLst/>
         <a:defRPr sz="2400" b="0" i="0" u="none" strike="noStrike" cap="none" spc="0" baseline="0">
           <a:ln>
             <a:noFill/>
@@ -2931,7 +2867,6 @@
         <a:buSzTx/>
         <a:buFontTx/>
         <a:buNone/>
-        <a:tabLst/>
         <a:defRPr sz="2400" b="0" i="0" u="none" strike="noStrike" cap="none" spc="0" baseline="0">
           <a:ln>
             <a:noFill/>
@@ -2960,7 +2895,6 @@
         <a:buSzTx/>
         <a:buFontTx/>
         <a:buNone/>
-        <a:tabLst/>
         <a:defRPr sz="2400" b="0" i="0" u="none" strike="noStrike" cap="none" spc="0" baseline="0">
           <a:ln>
             <a:noFill/>
@@ -2989,7 +2923,6 @@
         <a:buSzTx/>
         <a:buFontTx/>
         <a:buNone/>
-        <a:tabLst/>
         <a:defRPr sz="2400" b="0" i="0" u="none" strike="noStrike" cap="none" spc="0" baseline="0">
           <a:ln>
             <a:noFill/>
@@ -3018,7 +2951,6 @@
         <a:buSzTx/>
         <a:buFontTx/>
         <a:buNone/>
-        <a:tabLst/>
         <a:defRPr sz="2400" b="0" i="0" u="none" strike="noStrike" cap="none" spc="0" baseline="0">
           <a:ln>
             <a:noFill/>
@@ -3047,7 +2979,6 @@
         <a:buSzTx/>
         <a:buFontTx/>
         <a:buNone/>
-        <a:tabLst/>
         <a:defRPr sz="2400" b="0" i="0" u="none" strike="noStrike" cap="none" spc="0" baseline="0">
           <a:ln>
             <a:noFill/>
@@ -3076,7 +3007,6 @@
         <a:buSzTx/>
         <a:buFontTx/>
         <a:buNone/>
-        <a:tabLst/>
         <a:defRPr sz="2400" b="0" i="0" u="none" strike="noStrike" cap="none" spc="0" baseline="0">
           <a:ln>
             <a:noFill/>
@@ -3121,7 +3051,7 @@
         </p:nvSpPr>
         <p:spPr>
           <a:xfrm>
-            <a:off x="0" y="-63500"/>
+            <a:off x="113665" y="-177165"/>
             <a:ext cx="24384000" cy="7484170"/>
           </a:xfrm>
           <a:prstGeom prst="rect">
@@ -3151,7 +3081,6 @@
                 <a:sym typeface="Helvetica Neue Medium"/>
               </a:defRPr>
             </a:pPr>
-            <a:endParaRPr/>
           </a:p>
         </p:txBody>
       </p:sp>
@@ -3163,8 +3092,8 @@
         </p:nvSpPr>
         <p:spPr>
           <a:xfrm>
-            <a:off x="7224712" y="2330449"/>
-            <a:ext cx="9934576" cy="1079501"/>
+            <a:off x="6426200" y="2326957"/>
+            <a:ext cx="11531600" cy="1086485"/>
           </a:xfrm>
           <a:prstGeom prst="rect">
             <a:avLst/>
@@ -3172,11 +3101,6 @@
           <a:ln w="12700">
             <a:miter lim="400000"/>
           </a:ln>
-          <a:extLst>
-            <a:ext uri="{C572A759-6A51-4108-AA02-DFA0A04FC94B}">
-              <ma14:wrappingTextBoxFlag xmlns:ma14="http://schemas.microsoft.com/office/mac/drawingml/2011/main" val="1"/>
-            </a:ext>
-          </a:extLst>
         </p:spPr>
         <p:txBody>
           <a:bodyPr wrap="none" lIns="50800" tIns="50800" rIns="50800" bIns="50800" anchor="ctr">
@@ -3197,8 +3121,13 @@
           </a:lstStyle>
           <a:p>
             <a:r>
-              <a:t>Welcome To BigBlueButton</a:t>
-            </a:r>
+              <a:t>Welcome</a:t>
+            </a:r>
+            <a:r>
+              <a:rPr lang=""/>
+              <a:t>VISAR-Qtune Schools</a:t>
+            </a:r>
+            <a:endParaRPr lang=""/>
           </a:p>
         </p:txBody>
       </p:sp>
@@ -3238,7 +3167,6 @@
                 <a:sym typeface="Helvetica Neue Medium"/>
               </a:defRPr>
             </a:pPr>
-            <a:endParaRPr/>
           </a:p>
         </p:txBody>
       </p:sp>
@@ -3250,8 +3178,8 @@
         </p:nvSpPr>
         <p:spPr>
           <a:xfrm>
-            <a:off x="4609734" y="3581400"/>
-            <a:ext cx="14834332" cy="558801"/>
+            <a:off x="6413183" y="3579178"/>
+            <a:ext cx="11227435" cy="563245"/>
           </a:xfrm>
           <a:prstGeom prst="rect">
             <a:avLst/>
@@ -3259,11 +3187,6 @@
           <a:ln w="12700">
             <a:miter lim="400000"/>
           </a:ln>
-          <a:extLst>
-            <a:ext uri="{C572A759-6A51-4108-AA02-DFA0A04FC94B}">
-              <ma14:wrappingTextBoxFlag xmlns:ma14="http://schemas.microsoft.com/office/mac/drawingml/2011/main" val="1"/>
-            </a:ext>
-          </a:extLst>
         </p:spPr>
         <p:txBody>
           <a:bodyPr wrap="none" lIns="50800" tIns="50800" rIns="50800" bIns="50800" anchor="ctr">
@@ -3284,7 +3207,18 @@
           </a:lstStyle>
           <a:p>
             <a:r>
-              <a:t>BigBlueButton is an open source web conferencing system designed for online learning</a:t>
+              <a:rPr lang=""/>
+              <a:t>Visar-Qtune</a:t>
+            </a:r>
+            <a:r>
+              <a:t> is </a:t>
+            </a:r>
+            <a:r>
+              <a:rPr lang=""/>
+              <a:t>a</a:t>
+            </a:r>
+            <a:r>
+              <a:t> conferencing system designed for online learning</a:t>
             </a:r>
           </a:p>
         </p:txBody>
@@ -3316,11 +3250,6 @@
               </a:srgbClr>
             </a:outerShdw>
           </a:effectLst>
-          <a:extLst>
-            <a:ext uri="{C572A759-6A51-4108-AA02-DFA0A04FC94B}">
-              <ma14:wrappingTextBoxFlag xmlns:ma14="http://schemas.microsoft.com/office/mac/drawingml/2011/main" val="1"/>
-            </a:ext>
-          </a:extLst>
         </p:spPr>
         <p:txBody>
           <a:bodyPr lIns="0" tIns="0" rIns="0" bIns="0" anchor="ctr"/>
@@ -3361,11 +3290,6 @@
           <a:ln w="12700">
             <a:miter lim="400000"/>
           </a:ln>
-          <a:extLst>
-            <a:ext uri="{C572A759-6A51-4108-AA02-DFA0A04FC94B}">
-              <ma14:wrappingTextBoxFlag xmlns:ma14="http://schemas.microsoft.com/office/mac/drawingml/2011/main" val="1"/>
-            </a:ext>
-          </a:extLst>
         </p:spPr>
         <p:txBody>
           <a:bodyPr lIns="0" tIns="0" rIns="0" bIns="0">
@@ -3410,11 +3334,6 @@
           <a:ln w="12700">
             <a:miter lim="400000"/>
           </a:ln>
-          <a:extLst>
-            <a:ext uri="{C572A759-6A51-4108-AA02-DFA0A04FC94B}">
-              <ma14:wrappingTextBoxFlag xmlns:ma14="http://schemas.microsoft.com/office/mac/drawingml/2011/main" val="1"/>
-            </a:ext>
-          </a:extLst>
         </p:spPr>
         <p:txBody>
           <a:bodyPr lIns="0" tIns="0" rIns="0" bIns="0"/>
@@ -3477,7 +3396,6 @@
                 <a:sym typeface="Helvetica"/>
               </a:defRPr>
             </a:pPr>
-            <a:endParaRPr/>
           </a:p>
         </p:txBody>
       </p:sp>
@@ -3498,11 +3416,6 @@
           <a:ln w="12700">
             <a:miter lim="400000"/>
           </a:ln>
-          <a:extLst>
-            <a:ext uri="{C572A759-6A51-4108-AA02-DFA0A04FC94B}">
-              <ma14:wrappingTextBoxFlag xmlns:ma14="http://schemas.microsoft.com/office/mac/drawingml/2011/main" val="1"/>
-            </a:ext>
-          </a:extLst>
         </p:spPr>
         <p:txBody>
           <a:bodyPr lIns="0" tIns="0" rIns="0" bIns="0">
@@ -3547,11 +3460,6 @@
           <a:ln w="12700">
             <a:miter lim="400000"/>
           </a:ln>
-          <a:extLst>
-            <a:ext uri="{C572A759-6A51-4108-AA02-DFA0A04FC94B}">
-              <ma14:wrappingTextBoxFlag xmlns:ma14="http://schemas.microsoft.com/office/mac/drawingml/2011/main" val="1"/>
-            </a:ext>
-          </a:extLst>
         </p:spPr>
         <p:txBody>
           <a:bodyPr lIns="0" tIns="0" rIns="0" bIns="0"/>
@@ -3614,7 +3522,6 @@
                 <a:sym typeface="Helvetica"/>
               </a:defRPr>
             </a:pPr>
-            <a:endParaRPr/>
           </a:p>
         </p:txBody>
       </p:sp>
@@ -3635,11 +3542,6 @@
           <a:ln w="12700">
             <a:miter lim="400000"/>
           </a:ln>
-          <a:extLst>
-            <a:ext uri="{C572A759-6A51-4108-AA02-DFA0A04FC94B}">
-              <ma14:wrappingTextBoxFlag xmlns:ma14="http://schemas.microsoft.com/office/mac/drawingml/2011/main" val="1"/>
-            </a:ext>
-          </a:extLst>
         </p:spPr>
         <p:txBody>
           <a:bodyPr lIns="0" tIns="0" rIns="0" bIns="0">
@@ -3684,11 +3586,6 @@
           <a:ln w="12700">
             <a:miter lim="400000"/>
           </a:ln>
-          <a:extLst>
-            <a:ext uri="{C572A759-6A51-4108-AA02-DFA0A04FC94B}">
-              <ma14:wrappingTextBoxFlag xmlns:ma14="http://schemas.microsoft.com/office/mac/drawingml/2011/main" val="1"/>
-            </a:ext>
-          </a:extLst>
         </p:spPr>
         <p:txBody>
           <a:bodyPr lIns="0" tIns="0" rIns="0" bIns="0"/>
@@ -3713,6 +3610,7 @@
               <a:rPr dirty="0"/>
               <a:t>Communicate using high quality audio.</a:t>
             </a:r>
+            <a:endParaRPr dirty="0"/>
           </a:p>
         </p:txBody>
       </p:sp>
@@ -3752,7 +3650,6 @@
                 <a:sym typeface="Helvetica"/>
               </a:defRPr>
             </a:pPr>
-            <a:endParaRPr/>
           </a:p>
         </p:txBody>
       </p:sp>
@@ -3773,11 +3670,6 @@
           <a:ln w="12700">
             <a:miter lim="400000"/>
           </a:ln>
-          <a:extLst>
-            <a:ext uri="{C572A759-6A51-4108-AA02-DFA0A04FC94B}">
-              <ma14:wrappingTextBoxFlag xmlns:ma14="http://schemas.microsoft.com/office/mac/drawingml/2011/main" val="1"/>
-            </a:ext>
-          </a:extLst>
         </p:spPr>
         <p:txBody>
           <a:bodyPr lIns="0" tIns="0" rIns="0" bIns="0">
@@ -3820,11 +3712,6 @@
           <a:ln w="12700">
             <a:miter lim="400000"/>
           </a:ln>
-          <a:extLst>
-            <a:ext uri="{C572A759-6A51-4108-AA02-DFA0A04FC94B}">
-              <ma14:wrappingTextBoxFlag xmlns:ma14="http://schemas.microsoft.com/office/mac/drawingml/2011/main" val="1"/>
-            </a:ext>
-          </a:extLst>
         </p:spPr>
         <p:txBody>
           <a:bodyPr lIns="0" tIns="0" rIns="0" bIns="0"/>
@@ -3887,7 +3774,6 @@
                 <a:sym typeface="Helvetica"/>
               </a:defRPr>
             </a:pPr>
-            <a:endParaRPr/>
           </a:p>
         </p:txBody>
       </p:sp>
@@ -3908,11 +3794,6 @@
           <a:ln w="12700">
             <a:miter lim="400000"/>
           </a:ln>
-          <a:extLst>
-            <a:ext uri="{C572A759-6A51-4108-AA02-DFA0A04FC94B}">
-              <ma14:wrappingTextBoxFlag xmlns:ma14="http://schemas.microsoft.com/office/mac/drawingml/2011/main" val="1"/>
-            </a:ext>
-          </a:extLst>
         </p:spPr>
         <p:txBody>
           <a:bodyPr lIns="0" tIns="0" rIns="0" bIns="0">
@@ -3955,11 +3836,6 @@
           <a:ln w="12700">
             <a:miter lim="400000"/>
           </a:ln>
-          <a:extLst>
-            <a:ext uri="{C572A759-6A51-4108-AA02-DFA0A04FC94B}">
-              <ma14:wrappingTextBoxFlag xmlns:ma14="http://schemas.microsoft.com/office/mac/drawingml/2011/main" val="1"/>
-            </a:ext>
-          </a:extLst>
         </p:spPr>
         <p:txBody>
           <a:bodyPr lIns="0" tIns="0" rIns="0" bIns="0"/>
@@ -4022,7 +3898,6 @@
                 <a:sym typeface="Helvetica"/>
               </a:defRPr>
             </a:pPr>
-            <a:endParaRPr/>
           </a:p>
         </p:txBody>
       </p:sp>
@@ -4043,11 +3918,6 @@
           <a:ln w="12700">
             <a:miter lim="400000"/>
           </a:ln>
-          <a:extLst>
-            <a:ext uri="{C572A759-6A51-4108-AA02-DFA0A04FC94B}">
-              <ma14:wrappingTextBoxFlag xmlns:ma14="http://schemas.microsoft.com/office/mac/drawingml/2011/main" val="1"/>
-            </a:ext>
-          </a:extLst>
         </p:spPr>
         <p:txBody>
           <a:bodyPr lIns="0" tIns="0" rIns="0" bIns="0">
@@ -4090,11 +3960,6 @@
           <a:ln w="12700">
             <a:miter lim="400000"/>
           </a:ln>
-          <a:extLst>
-            <a:ext uri="{C572A759-6A51-4108-AA02-DFA0A04FC94B}">
-              <ma14:wrappingTextBoxFlag xmlns:ma14="http://schemas.microsoft.com/office/mac/drawingml/2011/main" val="1"/>
-            </a:ext>
-          </a:extLst>
         </p:spPr>
         <p:txBody>
           <a:bodyPr lIns="0" tIns="0" rIns="0" bIns="0"/>
@@ -4157,7 +4022,6 @@
                 <a:sym typeface="Helvetica"/>
               </a:defRPr>
             </a:pPr>
-            <a:endParaRPr/>
           </a:p>
         </p:txBody>
       </p:sp>
@@ -4178,11 +4042,6 @@
           <a:ln w="12700">
             <a:miter lim="400000"/>
           </a:ln>
-          <a:extLst>
-            <a:ext uri="{C572A759-6A51-4108-AA02-DFA0A04FC94B}">
-              <ma14:wrappingTextBoxFlag xmlns:ma14="http://schemas.microsoft.com/office/mac/drawingml/2011/main" val="1"/>
-            </a:ext>
-          </a:extLst>
         </p:spPr>
         <p:txBody>
           <a:bodyPr lIns="0" tIns="0" rIns="0" bIns="0">
@@ -4235,11 +4094,6 @@
           <a:ln w="12700">
             <a:miter lim="400000"/>
           </a:ln>
-          <a:extLst>
-            <a:ext uri="{C572A759-6A51-4108-AA02-DFA0A04FC94B}">
-              <ma14:wrappingTextBoxFlag xmlns:ma14="http://schemas.microsoft.com/office/mac/drawingml/2011/main" val="1"/>
-            </a:ext>
-          </a:extLst>
         </p:spPr>
         <p:txBody>
           <a:bodyPr lIns="0" tIns="0" rIns="0" bIns="0"/>
@@ -4302,7 +4156,6 @@
                 <a:sym typeface="Helvetica"/>
               </a:defRPr>
             </a:pPr>
-            <a:endParaRPr/>
           </a:p>
         </p:txBody>
       </p:sp>
@@ -4323,11 +4176,6 @@
           <a:ln w="12700">
             <a:miter lim="400000"/>
           </a:ln>
-          <a:extLst>
-            <a:ext uri="{C572A759-6A51-4108-AA02-DFA0A04FC94B}">
-              <ma14:wrappingTextBoxFlag xmlns:ma14="http://schemas.microsoft.com/office/mac/drawingml/2011/main" val="1"/>
-            </a:ext>
-          </a:extLst>
         </p:spPr>
         <p:txBody>
           <a:bodyPr lIns="0" tIns="0" rIns="0" bIns="0">
@@ -4370,11 +4218,6 @@
           <a:ln w="12700">
             <a:miter lim="400000"/>
           </a:ln>
-          <a:extLst>
-            <a:ext uri="{C572A759-6A51-4108-AA02-DFA0A04FC94B}">
-              <ma14:wrappingTextBoxFlag xmlns:ma14="http://schemas.microsoft.com/office/mac/drawingml/2011/main" val="1"/>
-            </a:ext>
-          </a:extLst>
         </p:spPr>
         <p:txBody>
           <a:bodyPr lIns="0" tIns="0" rIns="0" bIns="0"/>
@@ -4437,7 +4280,6 @@
                 <a:sym typeface="Helvetica"/>
               </a:defRPr>
             </a:pPr>
-            <a:endParaRPr/>
           </a:p>
         </p:txBody>
       </p:sp>
@@ -4449,8 +4291,8 @@
         </p:nvSpPr>
         <p:spPr>
           <a:xfrm>
-            <a:off x="6746255" y="11747599"/>
-            <a:ext cx="10561291" cy="711201"/>
+            <a:off x="7586028" y="11744742"/>
+            <a:ext cx="8881745" cy="716915"/>
           </a:xfrm>
           <a:prstGeom prst="rect">
             <a:avLst/>
@@ -4458,11 +4300,6 @@
           <a:ln w="12700">
             <a:miter lim="400000"/>
           </a:ln>
-          <a:extLst>
-            <a:ext uri="{C572A759-6A51-4108-AA02-DFA0A04FC94B}">
-              <ma14:wrappingTextBoxFlag xmlns:ma14="http://schemas.microsoft.com/office/mac/drawingml/2011/main" val="1"/>
-            </a:ext>
-          </a:extLst>
         </p:spPr>
         <p:txBody>
           <a:bodyPr wrap="none" lIns="50800" tIns="50800" rIns="50800" bIns="50800" anchor="ctr">
@@ -4486,19 +4323,16 @@
               <a:t>For more information visit </a:t>
             </a:r>
             <a:r>
-              <a:rPr u="sng" dirty="0">
-                <a:solidFill>
-                  <a:srgbClr val="0E70D7"/>
-                </a:solidFill>
-                <a:hlinkClick r:id="rId2"/>
+              <a:rPr lang="" dirty="0">
+                <a:hlinkClick r:id="rId1" tooltip="" action="ppaction://hlinkfile"/>
               </a:rPr>
-              <a:t>bigbluebutton.org →</a:t>
-            </a:r>
-            <a:endParaRPr u="sng" dirty="0">
+              <a:t>VISAR_Labs</a:t>
+            </a:r>
+            <a:endParaRPr lang="" u="sng" dirty="0">
               <a:solidFill>
                 <a:srgbClr val="0E70D7"/>
               </a:solidFill>
-              <a:hlinkClick r:id="rId3"/>
+              <a:hlinkClick r:id="rId2"/>
             </a:endParaRPr>
           </a:p>
         </p:txBody>
@@ -4512,9 +4346,7 @@
           <p:nvPr/>
         </p:nvPicPr>
         <p:blipFill>
-          <a:blip r:embed="rId4">
-            <a:extLst/>
-          </a:blip>
+          <a:blip r:embed="rId3"/>
           <a:stretch>
             <a:fillRect/>
           </a:stretch>
@@ -4529,6 +4361,8 @@
           </a:prstGeom>
           <a:ln w="12700">
             <a:miter lim="400000"/>
+            <a:headEnd/>
+            <a:tailEnd/>
           </a:ln>
         </p:spPr>
       </p:pic>
@@ -4541,9 +4375,7 @@
           <p:nvPr/>
         </p:nvPicPr>
         <p:blipFill>
-          <a:blip r:embed="rId5">
-            <a:extLst/>
-          </a:blip>
+          <a:blip r:embed="rId4"/>
           <a:stretch>
             <a:fillRect/>
           </a:stretch>
@@ -4558,6 +4390,8 @@
           </a:prstGeom>
           <a:ln w="12700">
             <a:miter lim="400000"/>
+            <a:headEnd/>
+            <a:tailEnd/>
           </a:ln>
         </p:spPr>
       </p:pic>
@@ -4570,9 +4404,7 @@
           <p:nvPr/>
         </p:nvPicPr>
         <p:blipFill>
-          <a:blip r:embed="rId6">
-            <a:extLst/>
-          </a:blip>
+          <a:blip r:embed="rId5"/>
           <a:stretch>
             <a:fillRect/>
           </a:stretch>
@@ -4587,6 +4419,8 @@
           </a:prstGeom>
           <a:ln w="12700">
             <a:miter lim="400000"/>
+            <a:headEnd/>
+            <a:tailEnd/>
           </a:ln>
         </p:spPr>
       </p:pic>
@@ -4599,9 +4433,7 @@
           <p:nvPr/>
         </p:nvPicPr>
         <p:blipFill>
-          <a:blip r:embed="rId7">
-            <a:extLst/>
-          </a:blip>
+          <a:blip r:embed="rId6"/>
           <a:stretch>
             <a:fillRect/>
           </a:stretch>
@@ -4616,6 +4448,8 @@
           </a:prstGeom>
           <a:ln w="12700">
             <a:miter lim="400000"/>
+            <a:headEnd/>
+            <a:tailEnd/>
           </a:ln>
         </p:spPr>
       </p:pic>
@@ -4628,9 +4462,7 @@
           <p:nvPr/>
         </p:nvPicPr>
         <p:blipFill>
-          <a:blip r:embed="rId8">
-            <a:extLst/>
-          </a:blip>
+          <a:blip r:embed="rId7"/>
           <a:stretch>
             <a:fillRect/>
           </a:stretch>
@@ -4645,6 +4477,8 @@
           </a:prstGeom>
           <a:ln w="12700">
             <a:miter lim="400000"/>
+            <a:headEnd/>
+            <a:tailEnd/>
           </a:ln>
         </p:spPr>
       </p:pic>
@@ -4657,9 +4491,7 @@
           <p:nvPr/>
         </p:nvPicPr>
         <p:blipFill>
-          <a:blip r:embed="rId9">
-            <a:extLst/>
-          </a:blip>
+          <a:blip r:embed="rId8"/>
           <a:stretch>
             <a:fillRect/>
           </a:stretch>
@@ -4674,6 +4506,8 @@
           </a:prstGeom>
           <a:ln w="12700">
             <a:miter lim="400000"/>
+            <a:headEnd/>
+            <a:tailEnd/>
           </a:ln>
         </p:spPr>
       </p:pic>
@@ -4686,9 +4520,7 @@
           <p:nvPr/>
         </p:nvPicPr>
         <p:blipFill>
-          <a:blip r:embed="rId10">
-            <a:extLst/>
-          </a:blip>
+          <a:blip r:embed="rId9"/>
           <a:stretch>
             <a:fillRect/>
           </a:stretch>
@@ -4703,6 +4535,8 @@
           </a:prstGeom>
           <a:ln w="12700">
             <a:miter lim="400000"/>
+            <a:headEnd/>
+            <a:tailEnd/>
           </a:ln>
         </p:spPr>
       </p:pic>
@@ -4715,9 +4549,7 @@
           <p:nvPr/>
         </p:nvPicPr>
         <p:blipFill>
-          <a:blip r:embed="rId11">
-            <a:extLst/>
-          </a:blip>
+          <a:blip r:embed="rId10"/>
           <a:stretch>
             <a:fillRect/>
           </a:stretch>
@@ -4732,30 +4564,30 @@
           </a:prstGeom>
           <a:ln w="12700">
             <a:miter lim="400000"/>
+            <a:headEnd/>
+            <a:tailEnd/>
           </a:ln>
         </p:spPr>
       </p:pic>
       <p:pic>
         <p:nvPicPr>
-          <p:cNvPr id="157" name="Image" descr="Image"/>
+          <p:cNvPr id="157" name="Image" descr="/home/fihlatv/Pictures/Qtune/android-chrome-192x192.pngandroid-chrome-192x192"/>
           <p:cNvPicPr>
             <a:picLocks noChangeAspect="1"/>
           </p:cNvPicPr>
           <p:nvPr/>
         </p:nvPicPr>
         <p:blipFill>
-          <a:blip r:embed="rId12">
-            <a:extLst/>
-          </a:blip>
-          <a:srcRect l="15" r="9" b="25"/>
+          <a:blip r:embed="rId11"/>
+          <a:srcRect/>
           <a:stretch>
             <a:fillRect/>
           </a:stretch>
         </p:blipFill>
         <p:spPr>
           <a:xfrm>
-            <a:off x="11506993" y="569066"/>
-            <a:ext cx="1596233" cy="1596233"/>
+            <a:off x="11507232" y="569066"/>
+            <a:ext cx="1595755" cy="1596233"/>
           </a:xfrm>
           <a:custGeom>
             <a:avLst/>
@@ -5086,6 +4918,8 @@
           </a:custGeom>
           <a:ln w="12700">
             <a:miter lim="400000"/>
+            <a:headEnd/>
+            <a:tailEnd/>
           </a:ln>
         </p:spPr>
       </p:pic>
@@ -5094,7 +4928,7 @@
   <p:clrMapOvr>
     <a:masterClrMapping/>
   </p:clrMapOvr>
-  <p:transition xmlns:p14="http://schemas.microsoft.com/office/powerpoint/2010/main" spd="med"/>
+  <p:transition spd="med"/>
 </p:sld>
 </file>
 
@@ -5169,7 +5003,6 @@
               <a:buSzTx/>
               <a:buFontTx/>
               <a:buNone/>
-              <a:tabLst/>
             </a:pPr>
             <a:r>
               <a:rPr kumimoji="0" lang="en-US" sz="3000" b="1" i="0" u="none" strike="noStrike" cap="none" spc="0" normalizeH="0" baseline="0" dirty="0" smtClean="0">
@@ -5210,16 +5043,11 @@
         </p:txBody>
       </p:sp>
     </p:spTree>
-    <p:extLst>
-      <p:ext uri="{BB962C8B-B14F-4D97-AF65-F5344CB8AC3E}">
-        <p14:creationId xmlns:p14="http://schemas.microsoft.com/office/powerpoint/2010/main" val="2227736033"/>
-      </p:ext>
-    </p:extLst>
   </p:cSld>
   <p:clrMapOvr>
     <a:masterClrMapping/>
   </p:clrMapOvr>
-  <p:transition xmlns:p14="http://schemas.microsoft.com/office/powerpoint/2010/main" spd="med"/>
+  <p:transition spd="med"/>
 </p:sld>
 </file>
 
@@ -5294,7 +5122,6 @@
               <a:buSzTx/>
               <a:buFontTx/>
               <a:buNone/>
-              <a:tabLst/>
             </a:pPr>
             <a:r>
               <a:rPr kumimoji="0" lang="en-US" sz="3000" b="1" i="0" u="none" strike="noStrike" cap="none" spc="0" normalizeH="0" baseline="0" dirty="0" smtClean="0">
@@ -5335,16 +5162,11 @@
         </p:txBody>
       </p:sp>
     </p:spTree>
-    <p:extLst>
-      <p:ext uri="{BB962C8B-B14F-4D97-AF65-F5344CB8AC3E}">
-        <p14:creationId xmlns:p14="http://schemas.microsoft.com/office/powerpoint/2010/main" val="2476088095"/>
-      </p:ext>
-    </p:extLst>
   </p:cSld>
   <p:clrMapOvr>
     <a:masterClrMapping/>
   </p:clrMapOvr>
-  <p:transition xmlns:p14="http://schemas.microsoft.com/office/powerpoint/2010/main" spd="med"/>
+  <p:transition spd="med"/>
 </p:sld>
 </file>
 
@@ -5419,7 +5241,6 @@
               <a:buSzTx/>
               <a:buFontTx/>
               <a:buNone/>
-              <a:tabLst/>
             </a:pPr>
             <a:r>
               <a:rPr kumimoji="0" lang="en-US" sz="3000" b="1" i="0" u="none" strike="noStrike" cap="none" spc="0" normalizeH="0" baseline="0" dirty="0" smtClean="0">
@@ -5460,16 +5281,11 @@
         </p:txBody>
       </p:sp>
     </p:spTree>
-    <p:extLst>
-      <p:ext uri="{BB962C8B-B14F-4D97-AF65-F5344CB8AC3E}">
-        <p14:creationId xmlns:p14="http://schemas.microsoft.com/office/powerpoint/2010/main" val="2476088095"/>
-      </p:ext>
-    </p:extLst>
   </p:cSld>
   <p:clrMapOvr>
     <a:masterClrMapping/>
   </p:clrMapOvr>
-  <p:transition xmlns:p14="http://schemas.microsoft.com/office/powerpoint/2010/main" spd="med"/>
+  <p:transition spd="med"/>
 </p:sld>
 </file>
 
@@ -5544,7 +5360,6 @@
               <a:buSzTx/>
               <a:buFontTx/>
               <a:buNone/>
-              <a:tabLst/>
             </a:pPr>
             <a:r>
               <a:rPr kumimoji="0" lang="en-US" sz="3000" b="1" i="0" u="none" strike="noStrike" cap="none" spc="0" normalizeH="0" baseline="0" dirty="0" smtClean="0">
@@ -5585,16 +5400,11 @@
         </p:txBody>
       </p:sp>
     </p:spTree>
-    <p:extLst>
-      <p:ext uri="{BB962C8B-B14F-4D97-AF65-F5344CB8AC3E}">
-        <p14:creationId xmlns:p14="http://schemas.microsoft.com/office/powerpoint/2010/main" val="2476088095"/>
-      </p:ext>
-    </p:extLst>
   </p:cSld>
   <p:clrMapOvr>
     <a:masterClrMapping/>
   </p:clrMapOvr>
-  <p:transition xmlns:p14="http://schemas.microsoft.com/office/powerpoint/2010/main" spd="med"/>
+  <p:transition spd="med"/>
 </p:sld>
 </file>
 
@@ -5669,7 +5479,6 @@
               <a:buSzTx/>
               <a:buFontTx/>
               <a:buNone/>
-              <a:tabLst/>
             </a:pPr>
             <a:r>
               <a:rPr kumimoji="0" lang="en-US" sz="3000" b="1" i="0" u="none" strike="noStrike" cap="none" spc="0" normalizeH="0" baseline="0" dirty="0" smtClean="0">
@@ -5710,16 +5519,11 @@
         </p:txBody>
       </p:sp>
     </p:spTree>
-    <p:extLst>
-      <p:ext uri="{BB962C8B-B14F-4D97-AF65-F5344CB8AC3E}">
-        <p14:creationId xmlns:p14="http://schemas.microsoft.com/office/powerpoint/2010/main" val="2476088095"/>
-      </p:ext>
-    </p:extLst>
   </p:cSld>
   <p:clrMapOvr>
     <a:masterClrMapping/>
   </p:clrMapOvr>
-  <p:transition xmlns:p14="http://schemas.microsoft.com/office/powerpoint/2010/main" spd="med"/>
+  <p:transition spd="med"/>
 </p:sld>
 </file>
 
@@ -5920,8 +5724,6 @@
           <a:noFill/>
           <a:miter lim="400000"/>
         </a:ln>
-        <a:effectLst/>
-        <a:sp3d/>
       </a:spPr>
       <a:bodyPr rot="0" spcFirstLastPara="1" vertOverflow="overflow" horzOverflow="overflow" vert="horz" wrap="square" lIns="0" tIns="0" rIns="0" bIns="0" numCol="1" spcCol="38100" rtlCol="0" anchor="ctr">
         <a:spAutoFit/>
@@ -5941,7 +5743,6 @@
           <a:buSzTx/>
           <a:buFontTx/>
           <a:buNone/>
-          <a:tabLst/>
           <a:defRPr kumimoji="0" sz="3200" b="0" i="0" u="none" strike="noStrike" cap="none" spc="0" normalizeH="0" baseline="0">
             <a:ln>
               <a:noFill/>
@@ -5971,7 +5772,6 @@
           <a:buSzTx/>
           <a:buFontTx/>
           <a:buNone/>
-          <a:tabLst/>
           <a:defRPr kumimoji="0" sz="1800" b="0" i="0" u="none" strike="noStrike" cap="none" spc="0" normalizeH="0" baseline="0">
             <a:ln>
               <a:noFill/>
@@ -5997,7 +5797,6 @@
           <a:buSzTx/>
           <a:buFontTx/>
           <a:buNone/>
-          <a:tabLst/>
           <a:defRPr kumimoji="0" sz="1800" b="0" i="0" u="none" strike="noStrike" cap="none" spc="0" normalizeH="0" baseline="0">
             <a:ln>
               <a:noFill/>
@@ -6023,7 +5822,6 @@
           <a:buSzTx/>
           <a:buFontTx/>
           <a:buNone/>
-          <a:tabLst/>
           <a:defRPr kumimoji="0" sz="1800" b="0" i="0" u="none" strike="noStrike" cap="none" spc="0" normalizeH="0" baseline="0">
             <a:ln>
               <a:noFill/>
@@ -6049,7 +5847,6 @@
           <a:buSzTx/>
           <a:buFontTx/>
           <a:buNone/>
-          <a:tabLst/>
           <a:defRPr kumimoji="0" sz="1800" b="0" i="0" u="none" strike="noStrike" cap="none" spc="0" normalizeH="0" baseline="0">
             <a:ln>
               <a:noFill/>
@@ -6075,7 +5872,6 @@
           <a:buSzTx/>
           <a:buFontTx/>
           <a:buNone/>
-          <a:tabLst/>
           <a:defRPr kumimoji="0" sz="1800" b="0" i="0" u="none" strike="noStrike" cap="none" spc="0" normalizeH="0" baseline="0">
             <a:ln>
               <a:noFill/>
@@ -6101,7 +5897,6 @@
           <a:buSzTx/>
           <a:buFontTx/>
           <a:buNone/>
-          <a:tabLst/>
           <a:defRPr kumimoji="0" sz="1800" b="0" i="0" u="none" strike="noStrike" cap="none" spc="0" normalizeH="0" baseline="0">
             <a:ln>
               <a:noFill/>
@@ -6127,7 +5922,6 @@
           <a:buSzTx/>
           <a:buFontTx/>
           <a:buNone/>
-          <a:tabLst/>
           <a:defRPr kumimoji="0" sz="1800" b="0" i="0" u="none" strike="noStrike" cap="none" spc="0" normalizeH="0" baseline="0">
             <a:ln>
               <a:noFill/>
@@ -6153,7 +5947,6 @@
           <a:buSzTx/>
           <a:buFontTx/>
           <a:buNone/>
-          <a:tabLst/>
           <a:defRPr kumimoji="0" sz="1800" b="0" i="0" u="none" strike="noStrike" cap="none" spc="0" normalizeH="0" baseline="0">
             <a:ln>
               <a:noFill/>
@@ -6179,7 +5972,6 @@
           <a:buSzTx/>
           <a:buFontTx/>
           <a:buNone/>
-          <a:tabLst/>
           <a:defRPr kumimoji="0" sz="1800" b="0" i="0" u="none" strike="noStrike" cap="none" spc="0" normalizeH="0" baseline="0">
             <a:ln>
               <a:noFill/>
@@ -6215,8 +6007,6 @@
           <a:prstDash val="solid"/>
           <a:miter lim="400000"/>
         </a:ln>
-        <a:effectLst/>
-        <a:sp3d/>
       </a:spPr>
       <a:bodyPr rot="0" spcFirstLastPara="1" vertOverflow="overflow" horzOverflow="overflow" vert="horz" wrap="square" lIns="91439" tIns="45719" rIns="91439" bIns="45719" numCol="1" spcCol="38100" rtlCol="0" anchor="t">
         <a:noAutofit/>
@@ -6236,7 +6026,6 @@
           <a:buSzTx/>
           <a:buFontTx/>
           <a:buNone/>
-          <a:tabLst/>
           <a:defRPr kumimoji="0" sz="1800" b="0" i="0" u="none" strike="noStrike" cap="none" spc="0" normalizeH="0" baseline="0">
             <a:ln>
               <a:noFill/>
@@ -6262,7 +6051,6 @@
           <a:buSzTx/>
           <a:buFontTx/>
           <a:buNone/>
-          <a:tabLst/>
           <a:defRPr kumimoji="0" sz="1800" b="0" i="0" u="none" strike="noStrike" cap="none" spc="0" normalizeH="0" baseline="0">
             <a:ln>
               <a:noFill/>
@@ -6288,7 +6076,6 @@
           <a:buSzTx/>
           <a:buFontTx/>
           <a:buNone/>
-          <a:tabLst/>
           <a:defRPr kumimoji="0" sz="1800" b="0" i="0" u="none" strike="noStrike" cap="none" spc="0" normalizeH="0" baseline="0">
             <a:ln>
               <a:noFill/>
@@ -6314,7 +6101,6 @@
           <a:buSzTx/>
           <a:buFontTx/>
           <a:buNone/>
-          <a:tabLst/>
           <a:defRPr kumimoji="0" sz="1800" b="0" i="0" u="none" strike="noStrike" cap="none" spc="0" normalizeH="0" baseline="0">
             <a:ln>
               <a:noFill/>
@@ -6340,7 +6126,6 @@
           <a:buSzTx/>
           <a:buFontTx/>
           <a:buNone/>
-          <a:tabLst/>
           <a:defRPr kumimoji="0" sz="1800" b="0" i="0" u="none" strike="noStrike" cap="none" spc="0" normalizeH="0" baseline="0">
             <a:ln>
               <a:noFill/>
@@ -6366,7 +6151,6 @@
           <a:buSzTx/>
           <a:buFontTx/>
           <a:buNone/>
-          <a:tabLst/>
           <a:defRPr kumimoji="0" sz="1800" b="0" i="0" u="none" strike="noStrike" cap="none" spc="0" normalizeH="0" baseline="0">
             <a:ln>
               <a:noFill/>
@@ -6392,7 +6176,6 @@
           <a:buSzTx/>
           <a:buFontTx/>
           <a:buNone/>
-          <a:tabLst/>
           <a:defRPr kumimoji="0" sz="1800" b="0" i="0" u="none" strike="noStrike" cap="none" spc="0" normalizeH="0" baseline="0">
             <a:ln>
               <a:noFill/>
@@ -6418,7 +6201,6 @@
           <a:buSzTx/>
           <a:buFontTx/>
           <a:buNone/>
-          <a:tabLst/>
           <a:defRPr kumimoji="0" sz="1800" b="0" i="0" u="none" strike="noStrike" cap="none" spc="0" normalizeH="0" baseline="0">
             <a:ln>
               <a:noFill/>
@@ -6444,7 +6226,6 @@
           <a:buSzTx/>
           <a:buFontTx/>
           <a:buNone/>
-          <a:tabLst/>
           <a:defRPr kumimoji="0" sz="1800" b="0" i="0" u="none" strike="noStrike" cap="none" spc="0" normalizeH="0" baseline="0">
             <a:ln>
               <a:noFill/>
@@ -6470,7 +6251,6 @@
           <a:buSzTx/>
           <a:buFontTx/>
           <a:buNone/>
-          <a:tabLst/>
           <a:defRPr kumimoji="0" sz="1800" b="0" i="0" u="none" strike="noStrike" cap="none" spc="0" normalizeH="0" baseline="0">
             <a:ln>
               <a:noFill/>
@@ -6503,8 +6283,6 @@
           <a:noFill/>
           <a:miter lim="400000"/>
         </a:ln>
-        <a:effectLst/>
-        <a:sp3d/>
       </a:spPr>
       <a:bodyPr rot="0" spcFirstLastPara="1" vertOverflow="overflow" horzOverflow="overflow" vert="horz" wrap="square" lIns="50800" tIns="50800" rIns="50800" bIns="50800" numCol="1" spcCol="38100" rtlCol="0" anchor="ctr">
         <a:spAutoFit/>
@@ -6524,7 +6302,6 @@
           <a:buSzTx/>
           <a:buFontTx/>
           <a:buNone/>
-          <a:tabLst/>
           <a:defRPr kumimoji="0" sz="3000" b="1" i="0" u="none" strike="noStrike" cap="none" spc="0" normalizeH="0" baseline="0">
             <a:ln>
               <a:noFill/>
@@ -6554,7 +6331,6 @@
           <a:buSzTx/>
           <a:buFontTx/>
           <a:buNone/>
-          <a:tabLst/>
           <a:defRPr kumimoji="0" sz="1800" b="0" i="0" u="none" strike="noStrike" cap="none" spc="0" normalizeH="0" baseline="0">
             <a:ln>
               <a:noFill/>
@@ -6580,7 +6356,6 @@
           <a:buSzTx/>
           <a:buFontTx/>
           <a:buNone/>
-          <a:tabLst/>
           <a:defRPr kumimoji="0" sz="1800" b="0" i="0" u="none" strike="noStrike" cap="none" spc="0" normalizeH="0" baseline="0">
             <a:ln>
               <a:noFill/>
@@ -6606,7 +6381,6 @@
           <a:buSzTx/>
           <a:buFontTx/>
           <a:buNone/>
-          <a:tabLst/>
           <a:defRPr kumimoji="0" sz="1800" b="0" i="0" u="none" strike="noStrike" cap="none" spc="0" normalizeH="0" baseline="0">
             <a:ln>
               <a:noFill/>
@@ -6632,7 +6406,6 @@
           <a:buSzTx/>
           <a:buFontTx/>
           <a:buNone/>
-          <a:tabLst/>
           <a:defRPr kumimoji="0" sz="1800" b="0" i="0" u="none" strike="noStrike" cap="none" spc="0" normalizeH="0" baseline="0">
             <a:ln>
               <a:noFill/>
@@ -6658,7 +6431,6 @@
           <a:buSzTx/>
           <a:buFontTx/>
           <a:buNone/>
-          <a:tabLst/>
           <a:defRPr kumimoji="0" sz="1800" b="0" i="0" u="none" strike="noStrike" cap="none" spc="0" normalizeH="0" baseline="0">
             <a:ln>
               <a:noFill/>
@@ -6684,7 +6456,6 @@
           <a:buSzTx/>
           <a:buFontTx/>
           <a:buNone/>
-          <a:tabLst/>
           <a:defRPr kumimoji="0" sz="1800" b="0" i="0" u="none" strike="noStrike" cap="none" spc="0" normalizeH="0" baseline="0">
             <a:ln>
               <a:noFill/>
@@ -6710,7 +6481,6 @@
           <a:buSzTx/>
           <a:buFontTx/>
           <a:buNone/>
-          <a:tabLst/>
           <a:defRPr kumimoji="0" sz="1800" b="0" i="0" u="none" strike="noStrike" cap="none" spc="0" normalizeH="0" baseline="0">
             <a:ln>
               <a:noFill/>
@@ -6736,7 +6506,6 @@
           <a:buSzTx/>
           <a:buFontTx/>
           <a:buNone/>
-          <a:tabLst/>
           <a:defRPr kumimoji="0" sz="1800" b="0" i="0" u="none" strike="noStrike" cap="none" spc="0" normalizeH="0" baseline="0">
             <a:ln>
               <a:noFill/>
@@ -6762,7 +6531,6 @@
           <a:buSzTx/>
           <a:buFontTx/>
           <a:buNone/>
-          <a:tabLst/>
           <a:defRPr kumimoji="0" sz="1800" b="0" i="0" u="none" strike="noStrike" cap="none" spc="0" normalizeH="0" baseline="0">
             <a:ln>
               <a:noFill/>
@@ -6789,7 +6557,11 @@
       </a:style>
     </a:txDef>
   </a:objectDefaults>
-  <a:extraClrSchemeLst/>
+  <a:extLst>
+    <a:ext uri="{05A4C25C-085E-4340-85A3-A5531E510DB2}">
+      <thm15:themeFamily xmlns:thm15="http://schemas.microsoft.com/office/thememl/2012/main" name="Office Theme" id="{62F939B6-93AF-4DB8-9C6B-D6C7DFDC589F}" vid="{4A3C46E8-61CC-4603-A589-7422A47A8E4A}"/>
+    </a:ext>
+  </a:extLst>
 </a:theme>
 </file>
 
@@ -6990,8 +6762,6 @@
           <a:noFill/>
           <a:miter lim="400000"/>
         </a:ln>
-        <a:effectLst/>
-        <a:sp3d/>
       </a:spPr>
       <a:bodyPr rot="0" spcFirstLastPara="1" vertOverflow="overflow" horzOverflow="overflow" vert="horz" wrap="square" lIns="0" tIns="0" rIns="0" bIns="0" numCol="1" spcCol="38100" rtlCol="0" anchor="ctr">
         <a:spAutoFit/>
@@ -7011,7 +6781,6 @@
           <a:buSzTx/>
           <a:buFontTx/>
           <a:buNone/>
-          <a:tabLst/>
           <a:defRPr kumimoji="0" sz="3200" b="0" i="0" u="none" strike="noStrike" cap="none" spc="0" normalizeH="0" baseline="0">
             <a:ln>
               <a:noFill/>
@@ -7041,7 +6810,6 @@
           <a:buSzTx/>
           <a:buFontTx/>
           <a:buNone/>
-          <a:tabLst/>
           <a:defRPr kumimoji="0" sz="1800" b="0" i="0" u="none" strike="noStrike" cap="none" spc="0" normalizeH="0" baseline="0">
             <a:ln>
               <a:noFill/>
@@ -7067,7 +6835,6 @@
           <a:buSzTx/>
           <a:buFontTx/>
           <a:buNone/>
-          <a:tabLst/>
           <a:defRPr kumimoji="0" sz="1800" b="0" i="0" u="none" strike="noStrike" cap="none" spc="0" normalizeH="0" baseline="0">
             <a:ln>
               <a:noFill/>
@@ -7093,7 +6860,6 @@
           <a:buSzTx/>
           <a:buFontTx/>
           <a:buNone/>
-          <a:tabLst/>
           <a:defRPr kumimoji="0" sz="1800" b="0" i="0" u="none" strike="noStrike" cap="none" spc="0" normalizeH="0" baseline="0">
             <a:ln>
               <a:noFill/>
@@ -7119,7 +6885,6 @@
           <a:buSzTx/>
           <a:buFontTx/>
           <a:buNone/>
-          <a:tabLst/>
           <a:defRPr kumimoji="0" sz="1800" b="0" i="0" u="none" strike="noStrike" cap="none" spc="0" normalizeH="0" baseline="0">
             <a:ln>
               <a:noFill/>
@@ -7145,7 +6910,6 @@
           <a:buSzTx/>
           <a:buFontTx/>
           <a:buNone/>
-          <a:tabLst/>
           <a:defRPr kumimoji="0" sz="1800" b="0" i="0" u="none" strike="noStrike" cap="none" spc="0" normalizeH="0" baseline="0">
             <a:ln>
               <a:noFill/>
@@ -7171,7 +6935,6 @@
           <a:buSzTx/>
           <a:buFontTx/>
           <a:buNone/>
-          <a:tabLst/>
           <a:defRPr kumimoji="0" sz="1800" b="0" i="0" u="none" strike="noStrike" cap="none" spc="0" normalizeH="0" baseline="0">
             <a:ln>
               <a:noFill/>
@@ -7197,7 +6960,6 @@
           <a:buSzTx/>
           <a:buFontTx/>
           <a:buNone/>
-          <a:tabLst/>
           <a:defRPr kumimoji="0" sz="1800" b="0" i="0" u="none" strike="noStrike" cap="none" spc="0" normalizeH="0" baseline="0">
             <a:ln>
               <a:noFill/>
@@ -7223,7 +6985,6 @@
           <a:buSzTx/>
           <a:buFontTx/>
           <a:buNone/>
-          <a:tabLst/>
           <a:defRPr kumimoji="0" sz="1800" b="0" i="0" u="none" strike="noStrike" cap="none" spc="0" normalizeH="0" baseline="0">
             <a:ln>
               <a:noFill/>
@@ -7249,7 +7010,6 @@
           <a:buSzTx/>
           <a:buFontTx/>
           <a:buNone/>
-          <a:tabLst/>
           <a:defRPr kumimoji="0" sz="1800" b="0" i="0" u="none" strike="noStrike" cap="none" spc="0" normalizeH="0" baseline="0">
             <a:ln>
               <a:noFill/>
@@ -7285,8 +7045,6 @@
           <a:prstDash val="solid"/>
           <a:miter lim="400000"/>
         </a:ln>
-        <a:effectLst/>
-        <a:sp3d/>
       </a:spPr>
       <a:bodyPr rot="0" spcFirstLastPara="1" vertOverflow="overflow" horzOverflow="overflow" vert="horz" wrap="square" lIns="91439" tIns="45719" rIns="91439" bIns="45719" numCol="1" spcCol="38100" rtlCol="0" anchor="t">
         <a:noAutofit/>
@@ -7306,7 +7064,6 @@
           <a:buSzTx/>
           <a:buFontTx/>
           <a:buNone/>
-          <a:tabLst/>
           <a:defRPr kumimoji="0" sz="1800" b="0" i="0" u="none" strike="noStrike" cap="none" spc="0" normalizeH="0" baseline="0">
             <a:ln>
               <a:noFill/>
@@ -7332,7 +7089,6 @@
           <a:buSzTx/>
           <a:buFontTx/>
           <a:buNone/>
-          <a:tabLst/>
           <a:defRPr kumimoji="0" sz="1800" b="0" i="0" u="none" strike="noStrike" cap="none" spc="0" normalizeH="0" baseline="0">
             <a:ln>
               <a:noFill/>
@@ -7358,7 +7114,6 @@
           <a:buSzTx/>
           <a:buFontTx/>
           <a:buNone/>
-          <a:tabLst/>
           <a:defRPr kumimoji="0" sz="1800" b="0" i="0" u="none" strike="noStrike" cap="none" spc="0" normalizeH="0" baseline="0">
             <a:ln>
               <a:noFill/>
@@ -7384,7 +7139,6 @@
           <a:buSzTx/>
           <a:buFontTx/>
           <a:buNone/>
-          <a:tabLst/>
           <a:defRPr kumimoji="0" sz="1800" b="0" i="0" u="none" strike="noStrike" cap="none" spc="0" normalizeH="0" baseline="0">
             <a:ln>
               <a:noFill/>
@@ -7410,7 +7164,6 @@
           <a:buSzTx/>
           <a:buFontTx/>
           <a:buNone/>
-          <a:tabLst/>
           <a:defRPr kumimoji="0" sz="1800" b="0" i="0" u="none" strike="noStrike" cap="none" spc="0" normalizeH="0" baseline="0">
             <a:ln>
               <a:noFill/>
@@ -7436,7 +7189,6 @@
           <a:buSzTx/>
           <a:buFontTx/>
           <a:buNone/>
-          <a:tabLst/>
           <a:defRPr kumimoji="0" sz="1800" b="0" i="0" u="none" strike="noStrike" cap="none" spc="0" normalizeH="0" baseline="0">
             <a:ln>
               <a:noFill/>
@@ -7462,7 +7214,6 @@
           <a:buSzTx/>
           <a:buFontTx/>
           <a:buNone/>
-          <a:tabLst/>
           <a:defRPr kumimoji="0" sz="1800" b="0" i="0" u="none" strike="noStrike" cap="none" spc="0" normalizeH="0" baseline="0">
             <a:ln>
               <a:noFill/>
@@ -7488,7 +7239,6 @@
           <a:buSzTx/>
           <a:buFontTx/>
           <a:buNone/>
-          <a:tabLst/>
           <a:defRPr kumimoji="0" sz="1800" b="0" i="0" u="none" strike="noStrike" cap="none" spc="0" normalizeH="0" baseline="0">
             <a:ln>
               <a:noFill/>
@@ -7514,7 +7264,6 @@
           <a:buSzTx/>
           <a:buFontTx/>
           <a:buNone/>
-          <a:tabLst/>
           <a:defRPr kumimoji="0" sz="1800" b="0" i="0" u="none" strike="noStrike" cap="none" spc="0" normalizeH="0" baseline="0">
             <a:ln>
               <a:noFill/>
@@ -7540,7 +7289,6 @@
           <a:buSzTx/>
           <a:buFontTx/>
           <a:buNone/>
-          <a:tabLst/>
           <a:defRPr kumimoji="0" sz="1800" b="0" i="0" u="none" strike="noStrike" cap="none" spc="0" normalizeH="0" baseline="0">
             <a:ln>
               <a:noFill/>
@@ -7573,8 +7321,6 @@
           <a:noFill/>
           <a:miter lim="400000"/>
         </a:ln>
-        <a:effectLst/>
-        <a:sp3d/>
       </a:spPr>
       <a:bodyPr rot="0" spcFirstLastPara="1" vertOverflow="overflow" horzOverflow="overflow" vert="horz" wrap="square" lIns="50800" tIns="50800" rIns="50800" bIns="50800" numCol="1" spcCol="38100" rtlCol="0" anchor="ctr">
         <a:spAutoFit/>
@@ -7594,7 +7340,6 @@
           <a:buSzTx/>
           <a:buFontTx/>
           <a:buNone/>
-          <a:tabLst/>
           <a:defRPr kumimoji="0" sz="3000" b="1" i="0" u="none" strike="noStrike" cap="none" spc="0" normalizeH="0" baseline="0">
             <a:ln>
               <a:noFill/>
@@ -7624,7 +7369,6 @@
           <a:buSzTx/>
           <a:buFontTx/>
           <a:buNone/>
-          <a:tabLst/>
           <a:defRPr kumimoji="0" sz="1800" b="0" i="0" u="none" strike="noStrike" cap="none" spc="0" normalizeH="0" baseline="0">
             <a:ln>
               <a:noFill/>
@@ -7650,7 +7394,6 @@
           <a:buSzTx/>
           <a:buFontTx/>
           <a:buNone/>
-          <a:tabLst/>
           <a:defRPr kumimoji="0" sz="1800" b="0" i="0" u="none" strike="noStrike" cap="none" spc="0" normalizeH="0" baseline="0">
             <a:ln>
               <a:noFill/>
@@ -7676,7 +7419,6 @@
           <a:buSzTx/>
           <a:buFontTx/>
           <a:buNone/>
-          <a:tabLst/>
           <a:defRPr kumimoji="0" sz="1800" b="0" i="0" u="none" strike="noStrike" cap="none" spc="0" normalizeH="0" baseline="0">
             <a:ln>
               <a:noFill/>
@@ -7702,7 +7444,6 @@
           <a:buSzTx/>
           <a:buFontTx/>
           <a:buNone/>
-          <a:tabLst/>
           <a:defRPr kumimoji="0" sz="1800" b="0" i="0" u="none" strike="noStrike" cap="none" spc="0" normalizeH="0" baseline="0">
             <a:ln>
               <a:noFill/>
@@ -7728,7 +7469,6 @@
           <a:buSzTx/>
           <a:buFontTx/>
           <a:buNone/>
-          <a:tabLst/>
           <a:defRPr kumimoji="0" sz="1800" b="0" i="0" u="none" strike="noStrike" cap="none" spc="0" normalizeH="0" baseline="0">
             <a:ln>
               <a:noFill/>
@@ -7754,7 +7494,6 @@
           <a:buSzTx/>
           <a:buFontTx/>
           <a:buNone/>
-          <a:tabLst/>
           <a:defRPr kumimoji="0" sz="1800" b="0" i="0" u="none" strike="noStrike" cap="none" spc="0" normalizeH="0" baseline="0">
             <a:ln>
               <a:noFill/>
@@ -7780,7 +7519,6 @@
           <a:buSzTx/>
           <a:buFontTx/>
           <a:buNone/>
-          <a:tabLst/>
           <a:defRPr kumimoji="0" sz="1800" b="0" i="0" u="none" strike="noStrike" cap="none" spc="0" normalizeH="0" baseline="0">
             <a:ln>
               <a:noFill/>
@@ -7806,7 +7544,6 @@
           <a:buSzTx/>
           <a:buFontTx/>
           <a:buNone/>
-          <a:tabLst/>
           <a:defRPr kumimoji="0" sz="1800" b="0" i="0" u="none" strike="noStrike" cap="none" spc="0" normalizeH="0" baseline="0">
             <a:ln>
               <a:noFill/>
@@ -7832,7 +7569,6 @@
           <a:buSzTx/>
           <a:buFontTx/>
           <a:buNone/>
-          <a:tabLst/>
           <a:defRPr kumimoji="0" sz="1800" b="0" i="0" u="none" strike="noStrike" cap="none" spc="0" normalizeH="0" baseline="0">
             <a:ln>
               <a:noFill/>
@@ -7859,6 +7595,10 @@
       </a:style>
     </a:txDef>
   </a:objectDefaults>
-  <a:extraClrSchemeLst/>
+  <a:extLst>
+    <a:ext uri="{05A4C25C-085E-4340-85A3-A5531E510DB2}">
+      <thm15:themeFamily xmlns:thm15="http://schemas.microsoft.com/office/thememl/2012/main" name="Office Theme" id="{62F939B6-93AF-4DB8-9C6B-D6C7DFDC589F}" vid="{4A3C46E8-61CC-4603-A589-7422A47A8E4A}"/>
+    </a:ext>
+  </a:extLst>
 </a:theme>
 </file>
</xml_diff>